<commit_message>
ppt update and Unet code update
</commit_message>
<xml_diff>
--- a/reports/meeting_ppt/4_22/Update_4_22.pptx
+++ b/reports/meeting_ppt/4_22/Update_4_22.pptx
@@ -11,6 +11,8 @@
     <p:sldId id="258" r:id="rId5"/>
     <p:sldId id="261" r:id="rId6"/>
     <p:sldId id="259" r:id="rId7"/>
+    <p:sldId id="256" r:id="rId8"/>
+    <p:sldId id="264" r:id="rId9"/>
   </p:sldIdLst>
   <p:sldSz cx="12192000" cy="6858000"/>
   <p:notesSz cx="6858000" cy="9144000"/>
@@ -264,7 +266,7 @@
           <a:p>
             <a:fld id="{9E6DD2FA-075B-4ECB-A065-7BE1D0BEAB6C}" type="datetimeFigureOut">
               <a:rPr lang="en-US" smtClean="0"/>
-              <a:t>4/21/2021</a:t>
+              <a:t>4/22/2021</a:t>
             </a:fld>
             <a:endParaRPr lang="en-US"/>
           </a:p>
@@ -462,7 +464,7 @@
           <a:p>
             <a:fld id="{9E6DD2FA-075B-4ECB-A065-7BE1D0BEAB6C}" type="datetimeFigureOut">
               <a:rPr lang="en-US" smtClean="0"/>
-              <a:t>4/21/2021</a:t>
+              <a:t>4/22/2021</a:t>
             </a:fld>
             <a:endParaRPr lang="en-US"/>
           </a:p>
@@ -670,7 +672,7 @@
           <a:p>
             <a:fld id="{9E6DD2FA-075B-4ECB-A065-7BE1D0BEAB6C}" type="datetimeFigureOut">
               <a:rPr lang="en-US" smtClean="0"/>
-              <a:t>4/21/2021</a:t>
+              <a:t>4/22/2021</a:t>
             </a:fld>
             <a:endParaRPr lang="en-US"/>
           </a:p>
@@ -868,7 +870,7 @@
           <a:p>
             <a:fld id="{9E6DD2FA-075B-4ECB-A065-7BE1D0BEAB6C}" type="datetimeFigureOut">
               <a:rPr lang="en-US" smtClean="0"/>
-              <a:t>4/21/2021</a:t>
+              <a:t>4/22/2021</a:t>
             </a:fld>
             <a:endParaRPr lang="en-US"/>
           </a:p>
@@ -1143,7 +1145,7 @@
           <a:p>
             <a:fld id="{9E6DD2FA-075B-4ECB-A065-7BE1D0BEAB6C}" type="datetimeFigureOut">
               <a:rPr lang="en-US" smtClean="0"/>
-              <a:t>4/21/2021</a:t>
+              <a:t>4/22/2021</a:t>
             </a:fld>
             <a:endParaRPr lang="en-US"/>
           </a:p>
@@ -1408,7 +1410,7 @@
           <a:p>
             <a:fld id="{9E6DD2FA-075B-4ECB-A065-7BE1D0BEAB6C}" type="datetimeFigureOut">
               <a:rPr lang="en-US" smtClean="0"/>
-              <a:t>4/21/2021</a:t>
+              <a:t>4/22/2021</a:t>
             </a:fld>
             <a:endParaRPr lang="en-US"/>
           </a:p>
@@ -1820,7 +1822,7 @@
           <a:p>
             <a:fld id="{9E6DD2FA-075B-4ECB-A065-7BE1D0BEAB6C}" type="datetimeFigureOut">
               <a:rPr lang="en-US" smtClean="0"/>
-              <a:t>4/21/2021</a:t>
+              <a:t>4/22/2021</a:t>
             </a:fld>
             <a:endParaRPr lang="en-US"/>
           </a:p>
@@ -1961,7 +1963,7 @@
           <a:p>
             <a:fld id="{9E6DD2FA-075B-4ECB-A065-7BE1D0BEAB6C}" type="datetimeFigureOut">
               <a:rPr lang="en-US" smtClean="0"/>
-              <a:t>4/21/2021</a:t>
+              <a:t>4/22/2021</a:t>
             </a:fld>
             <a:endParaRPr lang="en-US"/>
           </a:p>
@@ -2074,7 +2076,7 @@
           <a:p>
             <a:fld id="{9E6DD2FA-075B-4ECB-A065-7BE1D0BEAB6C}" type="datetimeFigureOut">
               <a:rPr lang="en-US" smtClean="0"/>
-              <a:t>4/21/2021</a:t>
+              <a:t>4/22/2021</a:t>
             </a:fld>
             <a:endParaRPr lang="en-US"/>
           </a:p>
@@ -2385,7 +2387,7 @@
           <a:p>
             <a:fld id="{9E6DD2FA-075B-4ECB-A065-7BE1D0BEAB6C}" type="datetimeFigureOut">
               <a:rPr lang="en-US" smtClean="0"/>
-              <a:t>4/21/2021</a:t>
+              <a:t>4/22/2021</a:t>
             </a:fld>
             <a:endParaRPr lang="en-US"/>
           </a:p>
@@ -2673,7 +2675,7 @@
           <a:p>
             <a:fld id="{9E6DD2FA-075B-4ECB-A065-7BE1D0BEAB6C}" type="datetimeFigureOut">
               <a:rPr lang="en-US" smtClean="0"/>
-              <a:t>4/21/2021</a:t>
+              <a:t>4/22/2021</a:t>
             </a:fld>
             <a:endParaRPr lang="en-US"/>
           </a:p>
@@ -2914,7 +2916,7 @@
           <a:p>
             <a:fld id="{9E6DD2FA-075B-4ECB-A065-7BE1D0BEAB6C}" type="datetimeFigureOut">
               <a:rPr lang="en-US" smtClean="0"/>
-              <a:t>4/21/2021</a:t>
+              <a:t>4/22/2021</a:t>
             </a:fld>
             <a:endParaRPr lang="en-US"/>
           </a:p>
@@ -4534,6 +4536,186 @@
 </p:sld>
 </file>
 
+<file path=ppt/slides/slide7.xml><?xml version="1.0" encoding="utf-8"?>
+<p:sld xmlns:a="http://schemas.openxmlformats.org/drawingml/2006/main" xmlns:r="http://schemas.openxmlformats.org/officeDocument/2006/relationships" xmlns:p="http://schemas.openxmlformats.org/presentationml/2006/main">
+  <p:cSld>
+    <p:spTree>
+      <p:nvGrpSpPr>
+        <p:cNvPr id="1" name=""/>
+        <p:cNvGrpSpPr/>
+        <p:nvPr/>
+      </p:nvGrpSpPr>
+      <p:grpSpPr>
+        <a:xfrm>
+          <a:off x="0" y="0"/>
+          <a:ext cx="0" cy="0"/>
+          <a:chOff x="0" y="0"/>
+          <a:chExt cx="0" cy="0"/>
+        </a:xfrm>
+      </p:grpSpPr>
+      <p:pic>
+        <p:nvPicPr>
+          <p:cNvPr id="7" name="Picture 6">
+            <a:extLst>
+              <a:ext uri="{FF2B5EF4-FFF2-40B4-BE49-F238E27FC236}">
+                <a16:creationId xmlns:a16="http://schemas.microsoft.com/office/drawing/2014/main" id="{E432518E-7315-4DF2-B9C7-324B44BF1423}"/>
+              </a:ext>
+            </a:extLst>
+          </p:cNvPr>
+          <p:cNvPicPr>
+            <a:picLocks noChangeAspect="1"/>
+          </p:cNvPicPr>
+          <p:nvPr/>
+        </p:nvPicPr>
+        <p:blipFill>
+          <a:blip r:embed="rId2"/>
+          <a:stretch>
+            <a:fillRect/>
+          </a:stretch>
+        </p:blipFill>
+        <p:spPr>
+          <a:xfrm>
+            <a:off x="539547" y="617635"/>
+            <a:ext cx="5096826" cy="4495785"/>
+          </a:xfrm>
+          <a:prstGeom prst="rect">
+            <a:avLst/>
+          </a:prstGeom>
+        </p:spPr>
+      </p:pic>
+      <p:pic>
+        <p:nvPicPr>
+          <p:cNvPr id="9" name="Picture 8">
+            <a:extLst>
+              <a:ext uri="{FF2B5EF4-FFF2-40B4-BE49-F238E27FC236}">
+                <a16:creationId xmlns:a16="http://schemas.microsoft.com/office/drawing/2014/main" id="{7D3B1AB1-671E-4728-AE0E-EC83554FAC9D}"/>
+              </a:ext>
+            </a:extLst>
+          </p:cNvPr>
+          <p:cNvPicPr>
+            <a:picLocks noChangeAspect="1"/>
+          </p:cNvPicPr>
+          <p:nvPr/>
+        </p:nvPicPr>
+        <p:blipFill>
+          <a:blip r:embed="rId3"/>
+          <a:stretch>
+            <a:fillRect/>
+          </a:stretch>
+        </p:blipFill>
+        <p:spPr>
+          <a:xfrm>
+            <a:off x="5982772" y="617635"/>
+            <a:ext cx="5910313" cy="5518469"/>
+          </a:xfrm>
+          <a:prstGeom prst="rect">
+            <a:avLst/>
+          </a:prstGeom>
+        </p:spPr>
+      </p:pic>
+    </p:spTree>
+    <p:extLst>
+      <p:ext uri="{BB962C8B-B14F-4D97-AF65-F5344CB8AC3E}">
+        <p14:creationId xmlns:p14="http://schemas.microsoft.com/office/powerpoint/2010/main" val="3210446448"/>
+      </p:ext>
+    </p:extLst>
+  </p:cSld>
+  <p:clrMapOvr>
+    <a:masterClrMapping/>
+  </p:clrMapOvr>
+</p:sld>
+</file>
+
+<file path=ppt/slides/slide8.xml><?xml version="1.0" encoding="utf-8"?>
+<p:sld xmlns:a="http://schemas.openxmlformats.org/drawingml/2006/main" xmlns:r="http://schemas.openxmlformats.org/officeDocument/2006/relationships" xmlns:p="http://schemas.openxmlformats.org/presentationml/2006/main">
+  <p:cSld>
+    <p:spTree>
+      <p:nvGrpSpPr>
+        <p:cNvPr id="1" name=""/>
+        <p:cNvGrpSpPr/>
+        <p:nvPr/>
+      </p:nvGrpSpPr>
+      <p:grpSpPr>
+        <a:xfrm>
+          <a:off x="0" y="0"/>
+          <a:ext cx="0" cy="0"/>
+          <a:chOff x="0" y="0"/>
+          <a:chExt cx="0" cy="0"/>
+        </a:xfrm>
+      </p:grpSpPr>
+      <p:pic>
+        <p:nvPicPr>
+          <p:cNvPr id="7" name="Picture 6">
+            <a:extLst>
+              <a:ext uri="{FF2B5EF4-FFF2-40B4-BE49-F238E27FC236}">
+                <a16:creationId xmlns:a16="http://schemas.microsoft.com/office/drawing/2014/main" id="{B4E11922-2834-41D8-8C1B-EE57BA37DAEF}"/>
+              </a:ext>
+            </a:extLst>
+          </p:cNvPr>
+          <p:cNvPicPr>
+            <a:picLocks noChangeAspect="1"/>
+          </p:cNvPicPr>
+          <p:nvPr/>
+        </p:nvPicPr>
+        <p:blipFill>
+          <a:blip r:embed="rId2"/>
+          <a:stretch>
+            <a:fillRect/>
+          </a:stretch>
+        </p:blipFill>
+        <p:spPr>
+          <a:xfrm>
+            <a:off x="196014" y="114113"/>
+            <a:ext cx="5791702" cy="4343776"/>
+          </a:xfrm>
+          <a:prstGeom prst="rect">
+            <a:avLst/>
+          </a:prstGeom>
+        </p:spPr>
+      </p:pic>
+      <p:pic>
+        <p:nvPicPr>
+          <p:cNvPr id="9" name="Picture 8">
+            <a:extLst>
+              <a:ext uri="{FF2B5EF4-FFF2-40B4-BE49-F238E27FC236}">
+                <a16:creationId xmlns:a16="http://schemas.microsoft.com/office/drawing/2014/main" id="{4167D03D-429F-4100-B16F-56ED6683C4CC}"/>
+              </a:ext>
+            </a:extLst>
+          </p:cNvPr>
+          <p:cNvPicPr>
+            <a:picLocks noChangeAspect="1"/>
+          </p:cNvPicPr>
+          <p:nvPr/>
+        </p:nvPicPr>
+        <p:blipFill>
+          <a:blip r:embed="rId3"/>
+          <a:stretch>
+            <a:fillRect/>
+          </a:stretch>
+        </p:blipFill>
+        <p:spPr>
+          <a:xfrm>
+            <a:off x="6096000" y="2554750"/>
+            <a:ext cx="5776461" cy="4122777"/>
+          </a:xfrm>
+          <a:prstGeom prst="rect">
+            <a:avLst/>
+          </a:prstGeom>
+        </p:spPr>
+      </p:pic>
+    </p:spTree>
+    <p:extLst>
+      <p:ext uri="{BB962C8B-B14F-4D97-AF65-F5344CB8AC3E}">
+        <p14:creationId xmlns:p14="http://schemas.microsoft.com/office/powerpoint/2010/main" val="1626001077"/>
+      </p:ext>
+    </p:extLst>
+  </p:cSld>
+  <p:clrMapOvr>
+    <a:masterClrMapping/>
+  </p:clrMapOvr>
+</p:sld>
+</file>
+
 <file path=ppt/theme/theme1.xml><?xml version="1.0" encoding="utf-8"?>
 <a:theme xmlns:a="http://schemas.openxmlformats.org/drawingml/2006/main" name="Office Theme">
   <a:themeElements>

</xml_diff>